<commit_message>
Changed 'name' to 'this.props.name'
</commit_message>
<xml_diff>
--- a/lesson-react-30-Best-Practices/react-best-practices.pptx
+++ b/lesson-react-30-Best-Practices/react-best-practices.pptx
@@ -1963,7 +1963,7 @@
           <a:noFill/>
           <a:extLst>
             <a:ext uri="{909E8E84-426E-40dd-AFC4-6F175D3DCCD1}">
-              <a14:hiddenFill xmlns="" xmlns:a14="http://schemas.microsoft.com/office/drawing/2010/main">
+              <a14:hiddenFill xmlns:a14="http://schemas.microsoft.com/office/drawing/2010/main" xmlns="">
                 <a:solidFill>
                   <a:srgbClr val="FFFFFF"/>
                 </a:solidFill>
@@ -14524,15 +14524,7 @@
             </a:pPr>
             <a:r>
               <a:rPr lang="en-US" dirty="0" smtClean="0"/>
-              <a:t>NO UI </a:t>
-            </a:r>
-            <a:r>
-              <a:rPr lang="en-US" dirty="0" smtClean="0"/>
-              <a:t>STATE OR </a:t>
-            </a:r>
-            <a:r>
-              <a:rPr lang="en-US" dirty="0" smtClean="0"/>
-              <a:t>APP STATE</a:t>
+              <a:t>NO UI STATE OR APP STATE</a:t>
             </a:r>
           </a:p>
           <a:p>
@@ -16555,6 +16547,30 @@
           <a:chExt cx="0" cy="0"/>
         </a:xfrm>
       </p:grpSpPr>
+      <p:pic>
+        <p:nvPicPr>
+          <p:cNvPr id="8" name="Picture 7"/>
+          <p:cNvPicPr>
+            <a:picLocks noChangeAspect="1"/>
+          </p:cNvPicPr>
+          <p:nvPr/>
+        </p:nvPicPr>
+        <p:blipFill>
+          <a:blip r:embed="rId2"/>
+          <a:stretch>
+            <a:fillRect/>
+          </a:stretch>
+        </p:blipFill>
+        <p:spPr>
+          <a:xfrm>
+            <a:off x="503106" y="1776667"/>
+            <a:ext cx="8412293" cy="4177295"/>
+          </a:xfrm>
+          <a:prstGeom prst="rect">
+            <a:avLst/>
+          </a:prstGeom>
+        </p:spPr>
+      </p:pic>
       <p:sp>
         <p:nvSpPr>
           <p:cNvPr id="2" name="Text Placeholder 1"/>
@@ -16684,30 +16700,6 @@
           </a:p>
         </p:txBody>
       </p:sp>
-      <p:pic>
-        <p:nvPicPr>
-          <p:cNvPr id="4" name="Picture 3"/>
-          <p:cNvPicPr>
-            <a:picLocks noChangeAspect="1"/>
-          </p:cNvPicPr>
-          <p:nvPr/>
-        </p:nvPicPr>
-        <p:blipFill>
-          <a:blip r:embed="rId2"/>
-          <a:stretch>
-            <a:fillRect/>
-          </a:stretch>
-        </p:blipFill>
-        <p:spPr>
-          <a:xfrm>
-            <a:off x="548920" y="1905000"/>
-            <a:ext cx="8204200" cy="4013200"/>
-          </a:xfrm>
-          <a:prstGeom prst="rect">
-            <a:avLst/>
-          </a:prstGeom>
-        </p:spPr>
-      </p:pic>
       <p:grpSp>
         <p:nvGrpSpPr>
           <p:cNvPr id="5" name="Group 4"/>

</xml_diff>